<commit_message>
Created short "Fresnel Equations" presentation
For the chapter 1 presentation for senior seminar.
</commit_message>
<xml_diff>
--- a/Presentations/Senior Seminar Chapter 01 Presentation.pptx
+++ b/Presentations/Senior Seminar Chapter 01 Presentation.pptx
@@ -10960,8 +10960,8 @@
         </p:blipFill>
         <p:spPr>
           <a:xfrm>
-            <a:off x="4335663" y="4895404"/>
-            <a:ext cx="2208980" cy="1759534"/>
+            <a:off x="4214297" y="4825033"/>
+            <a:ext cx="1936453" cy="1542456"/>
           </a:xfrm>
           <a:prstGeom prst="rect">
             <a:avLst/>
@@ -11000,6 +11000,41 @@
           </a:gradFill>
         </p:spPr>
       </p:pic>
+      <p:sp>
+        <p:nvSpPr>
+          <p:cNvPr id="21" name="TextBox 20">
+            <a:extLst>
+              <a:ext uri="{FF2B5EF4-FFF2-40B4-BE49-F238E27FC236}">
+                <a16:creationId xmlns:a16="http://schemas.microsoft.com/office/drawing/2014/main" id="{9CEAA3B4-4123-4762-BFF0-66236B3C5962}"/>
+              </a:ext>
+            </a:extLst>
+          </p:cNvPr>
+          <p:cNvSpPr txBox="1"/>
+          <p:nvPr/>
+        </p:nvSpPr>
+        <p:spPr>
+          <a:xfrm>
+            <a:off x="6501934" y="5813742"/>
+            <a:ext cx="4058060" cy="646331"/>
+          </a:xfrm>
+          <a:prstGeom prst="rect">
+            <a:avLst/>
+          </a:prstGeom>
+          <a:noFill/>
+        </p:spPr>
+        <p:txBody>
+          <a:bodyPr wrap="square" rtlCol="0">
+            <a:spAutoFit/>
+          </a:bodyPr>
+          <a:lstStyle/>
+          <a:p>
+            <a:r>
+              <a:rPr lang="en-US" dirty="0"/>
+              <a:t>Applies to any linear, isotropic, and homogeneous medium.</a:t>
+            </a:r>
+          </a:p>
+        </p:txBody>
+      </p:sp>
     </p:spTree>
     <p:extLst>
       <p:ext uri="{BB962C8B-B14F-4D97-AF65-F5344CB8AC3E}">

</xml_diff>

<commit_message>
Made minor edits to the single slide
</commit_message>
<xml_diff>
--- a/Presentations/Senior Seminar Chapter 01 Presentation.pptx
+++ b/Presentations/Senior Seminar Chapter 01 Presentation.pptx
@@ -10960,7 +10960,7 @@
         </p:blipFill>
         <p:spPr>
           <a:xfrm>
-            <a:off x="4214297" y="4825033"/>
+            <a:off x="6680038" y="5205265"/>
             <a:ext cx="1936453" cy="1542456"/>
           </a:xfrm>
           <a:prstGeom prst="rect">
@@ -11014,8 +11014,8 @@
         </p:nvSpPr>
         <p:spPr>
           <a:xfrm>
-            <a:off x="6501934" y="5813742"/>
-            <a:ext cx="4058060" cy="646331"/>
+            <a:off x="4034347" y="4885796"/>
+            <a:ext cx="2485138" cy="923330"/>
           </a:xfrm>
           <a:prstGeom prst="rect">
             <a:avLst/>
@@ -11045,81 +11045,6 @@
   <p:clrMapOvr>
     <a:masterClrMapping/>
   </p:clrMapOvr>
-  <p:timing>
-    <p:tnLst>
-      <p:par>
-        <p:cTn id="1" dur="indefinite" restart="never" nodeType="tmRoot">
-          <p:childTnLst>
-            <p:seq concurrent="1" nextAc="seek">
-              <p:cTn id="2" dur="indefinite" nodeType="mainSeq">
-                <p:childTnLst>
-                  <p:par>
-                    <p:cTn id="3" fill="hold">
-                      <p:stCondLst>
-                        <p:cond delay="indefinite"/>
-                      </p:stCondLst>
-                      <p:childTnLst>
-                        <p:par>
-                          <p:cTn id="4" fill="hold">
-                            <p:stCondLst>
-                              <p:cond delay="0"/>
-                            </p:stCondLst>
-                            <p:childTnLst>
-                              <p:par>
-                                <p:cTn id="5" presetID="1" presetClass="entr" presetSubtype="0" fill="hold" nodeType="clickEffect">
-                                  <p:stCondLst>
-                                    <p:cond delay="0"/>
-                                  </p:stCondLst>
-                                  <p:childTnLst>
-                                    <p:set>
-                                      <p:cBhvr>
-                                        <p:cTn id="6" dur="1" fill="hold">
-                                          <p:stCondLst>
-                                            <p:cond delay="0"/>
-                                          </p:stCondLst>
-                                        </p:cTn>
-                                        <p:tgtEl>
-                                          <p:spTgt spid="6"/>
-                                        </p:tgtEl>
-                                        <p:attrNameLst>
-                                          <p:attrName>style.visibility</p:attrName>
-                                        </p:attrNameLst>
-                                      </p:cBhvr>
-                                      <p:to>
-                                        <p:strVal val="visible"/>
-                                      </p:to>
-                                    </p:set>
-                                  </p:childTnLst>
-                                </p:cTn>
-                              </p:par>
-                            </p:childTnLst>
-                          </p:cTn>
-                        </p:par>
-                      </p:childTnLst>
-                    </p:cTn>
-                  </p:par>
-                </p:childTnLst>
-              </p:cTn>
-              <p:prevCondLst>
-                <p:cond evt="onPrev" delay="0">
-                  <p:tgtEl>
-                    <p:sldTgt/>
-                  </p:tgtEl>
-                </p:cond>
-              </p:prevCondLst>
-              <p:nextCondLst>
-                <p:cond evt="onNext" delay="0">
-                  <p:tgtEl>
-                    <p:sldTgt/>
-                  </p:tgtEl>
-                </p:cond>
-              </p:nextCondLst>
-            </p:seq>
-          </p:childTnLst>
-        </p:cTn>
-      </p:par>
-    </p:tnLst>
-  </p:timing>
 </p:sld>
 </file>
 

</xml_diff>